<commit_message>
feat: melhoria na formatação dos documentos
</commit_message>
<xml_diff>
--- a/aula-tech/aula-tech.pptx
+++ b/aula-tech/aula-tech.pptx
@@ -4244,31 +4244,39 @@
       </p:grpSpPr>
       <p:sp>
         <p:nvSpPr>
-          <p:cNvPr id="173" name="O que é uma GMUD?"/>
+          <p:cNvPr id="173" name="GMUD"/>
           <p:cNvSpPr txBox="1"/>
           <p:nvPr>
             <p:ph type="title"/>
           </p:nvPr>
         </p:nvSpPr>
         <p:spPr>
+          <a:xfrm>
+            <a:off x="377112" y="1077359"/>
+            <a:ext cx="21971001" cy="1433164"/>
+          </a:xfrm>
           <a:prstGeom prst="rect">
             <a:avLst/>
           </a:prstGeom>
         </p:spPr>
         <p:txBody>
           <a:bodyPr/>
-          <a:lstStyle/>
+          <a:lstStyle>
+            <a:lvl1pPr>
+              <a:defRPr spc="-140" sz="7000"/>
+            </a:lvl1pPr>
+          </a:lstStyle>
           <a:p>
             <a:pPr/>
             <a:r>
-              <a:t>O que é uma GMUD?</a:t>
+              <a:t>GMUD</a:t>
             </a:r>
           </a:p>
         </p:txBody>
       </p:sp>
       <p:sp>
         <p:nvSpPr>
-          <p:cNvPr id="174" name="GMUD é a sigla para Gestão de Mudanças, um processo formal utilizado em empresas e organizações para gerenciar e controlar as mudanças que precisam ser realizadas em sistemas de TI, processos de negócio, infraestrutura ou outros componentes importantes.G"/>
+          <p:cNvPr id="174" name="GMUD é a sigla para Gestão de Mudanças, um processo formal utilizado em empresas e organizações para gerenciar e controlar as mudanças que precisam ser realizadas em sistemas de TI, processos de negócio, infraestrutura ou outros componentes importantes.…"/>
           <p:cNvSpPr txBox="1"/>
           <p:nvPr>
             <p:ph type="body" idx="1"/>
@@ -4287,16 +4295,16 @@
           <a:bodyPr/>
           <a:lstStyle/>
           <a:p>
-            <a:pPr marL="0" indent="0" defTabSz="238252">
-              <a:lnSpc>
-                <a:spcPct val="100000"/>
-              </a:lnSpc>
-              <a:spcBef>
-                <a:spcPts val="0"/>
-              </a:spcBef>
-              <a:buSzTx/>
-              <a:buNone/>
-              <a:defRPr sz="2814"/>
+            <a:pPr marL="0" indent="0" defTabSz="224027">
+              <a:lnSpc>
+                <a:spcPct val="100000"/>
+              </a:lnSpc>
+              <a:spcBef>
+                <a:spcPts val="0"/>
+              </a:spcBef>
+              <a:buSzTx/>
+              <a:buNone/>
+              <a:defRPr sz="2646"/>
             </a:pPr>
             <a:r>
               <a:t>GMUD é a sigla para </a:t>
@@ -4306,191 +4314,227 @@
               <a:t>Gestão de Mudanças</a:t>
             </a:r>
             <a:r>
-              <a:t>, um processo formal utilizado em empresas e organizações para gerenciar e controlar as mudanças que precisam ser realizadas em sistemas de TI, processos de negócio, infraestrutura ou outros componentes importantes.GMUD é a sigla para </a:t>
-            </a:r>
+              <a:t>, um processo formal utilizado em empresas e organizações para gerenciar e controlar as mudanças que precisam ser realizadas em sistemas de TI, processos de negócio, infraestrutura ou outros componentes importantes.</a:t>
+            </a:r>
+          </a:p>
+          <a:p>
+            <a:pPr marL="0" indent="0" defTabSz="224027">
+              <a:lnSpc>
+                <a:spcPct val="100000"/>
+              </a:lnSpc>
+              <a:spcBef>
+                <a:spcPts val="0"/>
+              </a:spcBef>
+              <a:buSzTx/>
+              <a:buNone/>
+              <a:defRPr sz="2646"/>
+            </a:pPr>
+          </a:p>
+          <a:p>
+            <a:pPr marL="0" indent="0" defTabSz="224027">
+              <a:lnSpc>
+                <a:spcPct val="100000"/>
+              </a:lnSpc>
+              <a:spcBef>
+                <a:spcPts val="0"/>
+              </a:spcBef>
+              <a:buSzTx/>
+              <a:buNone/>
+              <a:defRPr sz="2646"/>
+            </a:pPr>
+            <a:r>
+              <a:t>É um conjunto de procedimentos e práticas que ajudam a garantir que qualquer alteração importante seja feita de maneira controlada, minimizando riscos e impactos negativos.</a:t>
+            </a:r>
+          </a:p>
+          <a:p>
+            <a:pPr marL="0" indent="0" defTabSz="224027">
+              <a:lnSpc>
+                <a:spcPct val="100000"/>
+              </a:lnSpc>
+              <a:spcBef>
+                <a:spcPts val="0"/>
+              </a:spcBef>
+              <a:buSzTx/>
+              <a:buNone/>
+              <a:defRPr sz="2646"/>
+            </a:pPr>
+          </a:p>
+          <a:p>
+            <a:pPr marL="0" indent="0" defTabSz="224027">
+              <a:lnSpc>
+                <a:spcPct val="100000"/>
+              </a:lnSpc>
+              <a:spcBef>
+                <a:spcPts val="0"/>
+              </a:spcBef>
+              <a:buSzTx/>
+              <a:buNone/>
+              <a:defRPr b="1" sz="2646"/>
+            </a:pPr>
+            <a:r>
+              <a:t>Etapas</a:t>
+            </a:r>
+          </a:p>
+          <a:p>
+            <a:pPr marL="0" indent="0" defTabSz="224027">
+              <a:lnSpc>
+                <a:spcPct val="100000"/>
+              </a:lnSpc>
+              <a:spcBef>
+                <a:spcPts val="0"/>
+              </a:spcBef>
+              <a:buSzTx/>
+              <a:buNone/>
+              <a:defRPr b="1" sz="2646"/>
+            </a:pPr>
+          </a:p>
+          <a:p>
+            <a:pPr marL="0" indent="0" defTabSz="224027">
+              <a:lnSpc>
+                <a:spcPct val="100000"/>
+              </a:lnSpc>
+              <a:spcBef>
+                <a:spcPts val="0"/>
+              </a:spcBef>
+              <a:buSzTx/>
+              <a:buNone/>
+              <a:defRPr sz="2646"/>
+            </a:pPr>
             <a:r>
               <a:rPr b="1"/>
-              <a:t>Gestão de Mudanças</a:t>
-            </a:r>
-            <a:r>
-              <a:t>, um processo formal utilizado em empresas e organizações para gerenciar e controlar as mudanças que precisam ser realizadas em sistemas de TI, processos de negócio, infraestrutura ou outros componentes importantes.</a:t>
-            </a:r>
-          </a:p>
-          <a:p>
-            <a:pPr marL="0" indent="0" defTabSz="238252">
-              <a:lnSpc>
-                <a:spcPct val="100000"/>
-              </a:lnSpc>
-              <a:spcBef>
-                <a:spcPts val="0"/>
-              </a:spcBef>
-              <a:buSzTx/>
-              <a:buNone/>
-              <a:defRPr sz="2814"/>
-            </a:pPr>
-          </a:p>
-          <a:p>
-            <a:pPr marL="0" indent="0" defTabSz="238252">
-              <a:lnSpc>
-                <a:spcPct val="100000"/>
-              </a:lnSpc>
-              <a:spcBef>
-                <a:spcPts val="0"/>
-              </a:spcBef>
-              <a:buSzTx/>
-              <a:buNone/>
-              <a:defRPr sz="2814"/>
-            </a:pPr>
-            <a:r>
-              <a:t>A GMUD é um conjunto de procedimentos e práticas que ajudam a garantir que qualquer alteração importante seja feita de maneira controlada, minimizando riscos e impactos negativos.</a:t>
-            </a:r>
-          </a:p>
-          <a:p>
-            <a:pPr marL="0" indent="0" defTabSz="238252">
-              <a:lnSpc>
-                <a:spcPct val="100000"/>
-              </a:lnSpc>
-              <a:spcBef>
-                <a:spcPts val="0"/>
-              </a:spcBef>
-              <a:buSzTx/>
-              <a:buNone/>
-              <a:defRPr sz="2814"/>
-            </a:pPr>
-          </a:p>
-          <a:p>
-            <a:pPr marL="0" indent="0" defTabSz="238252">
-              <a:lnSpc>
-                <a:spcPct val="100000"/>
-              </a:lnSpc>
-              <a:spcBef>
-                <a:spcPts val="0"/>
-              </a:spcBef>
-              <a:buSzTx/>
-              <a:buNone/>
-              <a:defRPr sz="2814"/>
-            </a:pPr>
-            <a:r>
-              <a:t>Etapas</a:t>
-            </a:r>
-          </a:p>
-          <a:p>
-            <a:pPr marL="0" indent="0" defTabSz="238252">
-              <a:lnSpc>
-                <a:spcPct val="100000"/>
-              </a:lnSpc>
-              <a:spcBef>
-                <a:spcPts val="0"/>
-              </a:spcBef>
-              <a:buSzTx/>
-              <a:buNone/>
-              <a:defRPr sz="2814"/>
+              <a:t>1.Pedido de Mudança</a:t>
+            </a:r>
+            <a:r>
+              <a:t>: Alguém identifica a necessidade de uma mudança e faz um pedido formal, descrevendo o que precisa ser alterado e por quê.</a:t>
+            </a:r>
+          </a:p>
+          <a:p>
+            <a:pPr marL="0" indent="0" defTabSz="224027">
+              <a:lnSpc>
+                <a:spcPct val="100000"/>
+              </a:lnSpc>
+              <a:spcBef>
+                <a:spcPts val="0"/>
+              </a:spcBef>
+              <a:buSzTx/>
+              <a:buNone/>
+              <a:defRPr sz="2646"/>
+            </a:pPr>
+          </a:p>
+          <a:p>
+            <a:pPr marL="0" indent="0" defTabSz="224027">
+              <a:lnSpc>
+                <a:spcPct val="100000"/>
+              </a:lnSpc>
+              <a:spcBef>
+                <a:spcPts val="0"/>
+              </a:spcBef>
+              <a:buSzTx/>
+              <a:buNone/>
+              <a:defRPr sz="2646"/>
             </a:pPr>
             <a:r>
               <a:rPr b="1"/>
-              <a:t>1 - Pedido de Mudança</a:t>
-            </a:r>
-            <a:r>
-              <a:t>: Alguém identifica a necessidade de uma mudança e faz um pedido formal, descrevendo o que precisa ser alterado e por quê.</a:t>
-            </a:r>
-          </a:p>
-          <a:p>
-            <a:pPr marL="0" indent="0" defTabSz="238252">
-              <a:lnSpc>
-                <a:spcPct val="100000"/>
-              </a:lnSpc>
-              <a:spcBef>
-                <a:spcPts val="0"/>
-              </a:spcBef>
-              <a:buSzTx/>
-              <a:buNone/>
-              <a:defRPr sz="2814"/>
-            </a:pPr>
-          </a:p>
-          <a:p>
-            <a:pPr marL="0" indent="0" defTabSz="238252">
-              <a:lnSpc>
-                <a:spcPct val="100000"/>
-              </a:lnSpc>
-              <a:spcBef>
-                <a:spcPts val="0"/>
-              </a:spcBef>
-              <a:buSzTx/>
-              <a:buNone/>
-              <a:defRPr sz="2814"/>
-            </a:pPr>
-            <a:r>
-              <a:t>2 - </a:t>
-            </a:r>
+              <a:t>2.Autorização</a:t>
+            </a:r>
+            <a:r>
+              <a:t>: Uma ou mais pessoas aprovam a solicitação de mudança, as mudanças são classificadas em tiers, em caso de tier 3 pra cima precisa apenas da aprovação de coordenador, abaixo disso precisa passar pelo CAB que é basicamente um grupo de pessoas que analisam o pedido para entender os riscos e os benefícios. Eles verificam se a mudança é realmente necessária e se é segura.</a:t>
+            </a:r>
+          </a:p>
+          <a:p>
+            <a:pPr marL="0" indent="0" defTabSz="224027">
+              <a:lnSpc>
+                <a:spcPct val="100000"/>
+              </a:lnSpc>
+              <a:spcBef>
+                <a:spcPts val="0"/>
+              </a:spcBef>
+              <a:buSzTx/>
+              <a:buNone/>
+              <a:defRPr sz="2646"/>
+            </a:pPr>
+          </a:p>
+          <a:p>
+            <a:pPr marL="0" indent="0" defTabSz="224027">
+              <a:lnSpc>
+                <a:spcPct val="100000"/>
+              </a:lnSpc>
+              <a:spcBef>
+                <a:spcPts val="0"/>
+              </a:spcBef>
+              <a:buSzTx/>
+              <a:buNone/>
+              <a:defRPr sz="2646"/>
+            </a:pPr>
             <a:r>
               <a:rPr b="1"/>
-              <a:t>Autorização</a:t>
-            </a:r>
-            <a:r>
-              <a:t>: Uma ou mais pessoas aprovam a solicitação de mudança, em caso de Tier 3 pra cima, precisa apenas da aprovação de coordenador, abaixo disso precisa passar pelo CAB que é basicamente um grupo de pessoas que analisam o pedido para entender os riscos e os benefícios. Eles verificam se a mudança é realmente necessária e se é segura.</a:t>
-            </a:r>
-          </a:p>
-          <a:p>
-            <a:pPr marL="0" indent="0" defTabSz="238252">
-              <a:lnSpc>
-                <a:spcPct val="100000"/>
-              </a:lnSpc>
-              <a:spcBef>
-                <a:spcPts val="0"/>
-              </a:spcBef>
-              <a:buSzTx/>
-              <a:buNone/>
-              <a:defRPr sz="2814"/>
-            </a:pPr>
-          </a:p>
-          <a:p>
-            <a:pPr marL="0" indent="0" defTabSz="238252">
-              <a:lnSpc>
-                <a:spcPct val="100000"/>
-              </a:lnSpc>
-              <a:spcBef>
-                <a:spcPts val="0"/>
-              </a:spcBef>
-              <a:buSzTx/>
-              <a:buNone/>
-              <a:defRPr sz="2814"/>
+              <a:t>3.Agendamento:</a:t>
+            </a:r>
+            <a:r>
+              <a:t> A mudança deve ser agendada para um dia de data verde, não é comum o agendamento de mudanças em dias de data vermelha que são basicamente dias de grande movimentação, antes de feriados e datas importantes. O horário pra agendamento de APP normalmente é a partir das 19 e infra a partir das 22.</a:t>
+            </a:r>
+          </a:p>
+          <a:p>
+            <a:pPr marL="0" indent="0" defTabSz="224027">
+              <a:lnSpc>
+                <a:spcPct val="100000"/>
+              </a:lnSpc>
+              <a:spcBef>
+                <a:spcPts val="0"/>
+              </a:spcBef>
+              <a:buSzTx/>
+              <a:buNone/>
+              <a:defRPr sz="2646"/>
+            </a:pPr>
+          </a:p>
+          <a:p>
+            <a:pPr marL="0" indent="0" defTabSz="224027">
+              <a:lnSpc>
+                <a:spcPct val="100000"/>
+              </a:lnSpc>
+              <a:spcBef>
+                <a:spcPts val="0"/>
+              </a:spcBef>
+              <a:buSzTx/>
+              <a:buNone/>
+              <a:defRPr sz="2646"/>
             </a:pPr>
             <a:r>
               <a:rPr b="1"/>
-              <a:t>3 - Implementação</a:t>
+              <a:t>4.Implementação</a:t>
             </a:r>
             <a:r>
               <a:t>: A mudança é realizada conforme o plano.	</a:t>
             </a:r>
           </a:p>
           <a:p>
-            <a:pPr marL="0" indent="0" defTabSz="238252">
-              <a:lnSpc>
-                <a:spcPct val="100000"/>
-              </a:lnSpc>
-              <a:spcBef>
-                <a:spcPts val="0"/>
-              </a:spcBef>
-              <a:buSzTx/>
-              <a:buNone/>
-              <a:defRPr sz="2814"/>
-            </a:pPr>
-          </a:p>
-          <a:p>
-            <a:pPr marL="0" indent="0" defTabSz="238252">
-              <a:lnSpc>
-                <a:spcPct val="100000"/>
-              </a:lnSpc>
-              <a:spcBef>
-                <a:spcPts val="0"/>
-              </a:spcBef>
-              <a:buSzTx/>
-              <a:buNone/>
-              <a:defRPr sz="2814"/>
+            <a:pPr marL="0" indent="0" defTabSz="224027">
+              <a:lnSpc>
+                <a:spcPct val="100000"/>
+              </a:lnSpc>
+              <a:spcBef>
+                <a:spcPts val="0"/>
+              </a:spcBef>
+              <a:buSzTx/>
+              <a:buNone/>
+              <a:defRPr sz="2646"/>
+            </a:pPr>
+          </a:p>
+          <a:p>
+            <a:pPr marL="0" indent="0" defTabSz="224027">
+              <a:lnSpc>
+                <a:spcPct val="100000"/>
+              </a:lnSpc>
+              <a:spcBef>
+                <a:spcPts val="0"/>
+              </a:spcBef>
+              <a:buSzTx/>
+              <a:buNone/>
+              <a:defRPr sz="2646"/>
             </a:pPr>
             <a:r>
               <a:rPr b="1"/>
-              <a:t>4 -  Verificação</a:t>
+              <a:t>5.Verificação</a:t>
             </a:r>
             <a:r>
               <a:t>: Durante e após a mudança, são feitos testes para garantir que tudo está funcionando como deveria. É o famoso ˜Acompanhar deploy˜</a:t>
@@ -4537,7 +4581,7 @@
       </p:grpSpPr>
       <p:sp>
         <p:nvSpPr>
-          <p:cNvPr id="176" name="O que é Taac?"/>
+          <p:cNvPr id="176" name="Taac"/>
           <p:cNvSpPr txBox="1"/>
           <p:nvPr>
             <p:ph type="title"/>
@@ -4550,11 +4594,15 @@
         </p:spPr>
         <p:txBody>
           <a:bodyPr/>
-          <a:lstStyle/>
+          <a:lstStyle>
+            <a:lvl1pPr>
+              <a:defRPr spc="-140" sz="7000"/>
+            </a:lvl1pPr>
+          </a:lstStyle>
           <a:p>
             <a:pPr/>
             <a:r>
-              <a:t>O que é Taac?</a:t>
+              <a:t>Taac</a:t>
             </a:r>
           </a:p>
         </p:txBody>
@@ -4570,7 +4618,7 @@
         <p:spPr>
           <a:xfrm>
             <a:off x="1206500" y="2518638"/>
-            <a:ext cx="21971001" cy="8256012"/>
+            <a:ext cx="21971000" cy="8256012"/>
           </a:xfrm>
           <a:prstGeom prst="rect">
             <a:avLst/>
@@ -4699,7 +4747,7 @@
       </p:grpSpPr>
       <p:sp>
         <p:nvSpPr>
-          <p:cNvPr id="179" name="O que é teste unitário/unit?"/>
+          <p:cNvPr id="179" name="Teste Unitário"/>
           <p:cNvSpPr txBox="1"/>
           <p:nvPr>
             <p:ph type="title"/>
@@ -4712,11 +4760,15 @@
         </p:spPr>
         <p:txBody>
           <a:bodyPr/>
-          <a:lstStyle/>
+          <a:lstStyle>
+            <a:lvl1pPr>
+              <a:defRPr spc="-140" sz="7000"/>
+            </a:lvl1pPr>
+          </a:lstStyle>
           <a:p>
             <a:pPr/>
             <a:r>
-              <a:t>O que é teste unitário/unit?</a:t>
+              <a:t>Teste Unitário</a:t>
             </a:r>
           </a:p>
         </p:txBody>
@@ -4783,7 +4835,7 @@
               <a:defRPr sz="4200"/>
             </a:pPr>
             <a:r>
-              <a:t>Por exemplo: imagine a função: retornarAMenorTaxa() dentro de um serviço de uma API, esse é apenas uma das funções executadas, o teste unitário deve ser feito para testar unicamente a função retornarAMenorTaxa() para validar se ela individualmente está funcionando como deveria, é claro para chegar nessa função outras funções são executadas, mas o teste unitário se preocupe em testar funções separadas ao contrário do teste integrado.</a:t>
+              <a:t>Imagine a função: retornarAMenorTaxa()  que falamos na precificação, esse é apenas uma das funções executadas dentro da precificação de uma proposta, e o teste unitário deve ser feito para testar unicamente a função retornarAMenorTaxa() e validar se ela individualmente está funcionando como deveria, é claro que para chegar nessa função outras funções são executadas antes ou depois dela, mas o teste unitário se preocupa em testar funções separadas, ao contrário do teste integrado que testa o fluxo inteiro.</a:t>
             </a:r>
           </a:p>
           <a:p>
@@ -4812,7 +4864,7 @@
               <a:defRPr sz="4200"/>
             </a:pPr>
             <a:r>
-              <a:t>Testes unitários devem cubrir uma porcentagem alto dos sistemas, 80% pra cima.</a:t>
+              <a:t>Testes unitários devem cobrir uma porcentagem alta dos sistemas, em alguns casos 80% pra cima.</a:t>
             </a:r>
           </a:p>
         </p:txBody>
@@ -4856,24 +4908,32 @@
       </p:grpSpPr>
       <p:sp>
         <p:nvSpPr>
-          <p:cNvPr id="182" name="O que é uma API?"/>
+          <p:cNvPr id="182" name="API"/>
           <p:cNvSpPr txBox="1"/>
           <p:nvPr>
             <p:ph type="title"/>
           </p:nvPr>
         </p:nvSpPr>
         <p:spPr>
+          <a:xfrm>
+            <a:off x="519293" y="1077359"/>
+            <a:ext cx="21971001" cy="1433164"/>
+          </a:xfrm>
           <a:prstGeom prst="rect">
             <a:avLst/>
           </a:prstGeom>
         </p:spPr>
         <p:txBody>
           <a:bodyPr/>
-          <a:lstStyle/>
+          <a:lstStyle>
+            <a:lvl1pPr>
+              <a:defRPr spc="-140" sz="7000"/>
+            </a:lvl1pPr>
+          </a:lstStyle>
           <a:p>
             <a:pPr/>
             <a:r>
-              <a:t>O que é uma API?</a:t>
+              <a:t>API</a:t>
             </a:r>
           </a:p>
         </p:txBody>
@@ -5125,7 +5185,7 @@
             </a:r>
             <a:br/>
             <a:r>
-              <a:t>Esse é a pagina principal, mas ao clicar em produto um vc é direcionado para um recurso específico com o detalhe e opção de compra:</a:t>
+              <a:t>Esse é a pagina principal, mas ao clicar em um produto um vc é direcionado para um recurso específico com o detalhe, opções de compra e etc. :</a:t>
             </a:r>
           </a:p>
           <a:p>
@@ -5499,7 +5559,7 @@
       </p:grpSpPr>
       <p:sp>
         <p:nvSpPr>
-          <p:cNvPr id="185" name="O que é um endpoint?"/>
+          <p:cNvPr id="185" name="Endpoint"/>
           <p:cNvSpPr txBox="1"/>
           <p:nvPr>
             <p:ph type="title"/>
@@ -5512,11 +5572,15 @@
         </p:spPr>
         <p:txBody>
           <a:bodyPr/>
-          <a:lstStyle/>
+          <a:lstStyle>
+            <a:lvl1pPr>
+              <a:defRPr spc="-140" sz="7000"/>
+            </a:lvl1pPr>
+          </a:lstStyle>
           <a:p>
             <a:pPr/>
             <a:r>
-              <a:t>O que é um endpoint?</a:t>
+              <a:t>Endpoint</a:t>
             </a:r>
           </a:p>
         </p:txBody>
@@ -5743,7 +5807,7 @@
       </p:grpSpPr>
       <p:sp>
         <p:nvSpPr>
-          <p:cNvPr id="188" name="O que é Gateway?"/>
+          <p:cNvPr id="188" name="Gateway"/>
           <p:cNvSpPr txBox="1"/>
           <p:nvPr>
             <p:ph type="title"/>
@@ -5756,11 +5820,15 @@
         </p:spPr>
         <p:txBody>
           <a:bodyPr/>
-          <a:lstStyle/>
+          <a:lstStyle>
+            <a:lvl1pPr>
+              <a:defRPr spc="-119" sz="6000"/>
+            </a:lvl1pPr>
+          </a:lstStyle>
           <a:p>
             <a:pPr/>
             <a:r>
-              <a:t>O que é Gateway?</a:t>
+              <a:t>Gateway</a:t>
             </a:r>
           </a:p>
         </p:txBody>
@@ -5786,107 +5854,94 @@
           <a:bodyPr/>
           <a:lstStyle/>
           <a:p>
-            <a:pPr marL="0" indent="0" defTabSz="252475">
-              <a:lnSpc>
-                <a:spcPct val="100000"/>
-              </a:lnSpc>
-              <a:spcBef>
-                <a:spcPts val="0"/>
-              </a:spcBef>
-              <a:buSzTx/>
-              <a:buNone/>
-              <a:defRPr sz="2982"/>
+            <a:pPr marL="0" indent="0" defTabSz="266700">
+              <a:lnSpc>
+                <a:spcPct val="100000"/>
+              </a:lnSpc>
+              <a:spcBef>
+                <a:spcPts val="0"/>
+              </a:spcBef>
+              <a:buSzTx/>
+              <a:buNone/>
+              <a:defRPr sz="3150"/>
             </a:pPr>
             <a:r>
               <a:t>O gateway de API é uma ferramenta de gerenciamento de APIs que fica entre o cliente e uma coleção de serviços de back-end.</a:t>
             </a:r>
           </a:p>
           <a:p>
-            <a:pPr marL="0" indent="0" defTabSz="252475">
-              <a:lnSpc>
-                <a:spcPct val="100000"/>
-              </a:lnSpc>
-              <a:spcBef>
-                <a:spcPts val="0"/>
-              </a:spcBef>
-              <a:buSzTx/>
-              <a:buNone/>
-              <a:defRPr sz="2982"/>
-            </a:pPr>
-          </a:p>
-          <a:p>
-            <a:pPr marL="0" indent="0" defTabSz="252475">
-              <a:lnSpc>
-                <a:spcPct val="100000"/>
-              </a:lnSpc>
-              <a:spcBef>
-                <a:spcPts val="0"/>
-              </a:spcBef>
-              <a:buSzTx/>
-              <a:buNone/>
-              <a:defRPr sz="2982"/>
-            </a:pPr>
-            <a:r>
-              <a:t>Um gateway é um dispositivo ou software que atua como intermediário entre dois sistemas ou redes diferentes, facilitando a comunicação entre eles. Ele desempenha o papel de "portão de entrada" ou "portal" que controla o acesso e direciona o tráfego de informações entre os sistemas.</a:t>
-            </a:r>
-          </a:p>
-          <a:p>
-            <a:pPr marL="0" indent="0" defTabSz="252475">
-              <a:lnSpc>
-                <a:spcPct val="100000"/>
-              </a:lnSpc>
-              <a:spcBef>
-                <a:spcPts val="0"/>
-              </a:spcBef>
-              <a:buSzTx/>
-              <a:buNone/>
-              <a:defRPr sz="2982"/>
-            </a:pPr>
-          </a:p>
-          <a:p>
-            <a:pPr marL="0" indent="0" defTabSz="252475">
-              <a:lnSpc>
-                <a:spcPct val="100000"/>
-              </a:lnSpc>
-              <a:spcBef>
-                <a:spcPts val="0"/>
-              </a:spcBef>
-              <a:buSzTx/>
-              <a:buNone/>
-              <a:defRPr sz="2982"/>
-            </a:pPr>
-          </a:p>
-          <a:p>
-            <a:pPr marL="0" indent="0" defTabSz="252475">
-              <a:lnSpc>
-                <a:spcPct val="100000"/>
-              </a:lnSpc>
-              <a:spcBef>
-                <a:spcPts val="0"/>
-              </a:spcBef>
-              <a:buSzTx/>
-              <a:buNone/>
-              <a:defRPr sz="2982"/>
-            </a:pPr>
-            <a:r>
-              <a:t>Gateway de API é uma ferramenta poderosa para gerenciar, proteger e otimizar o acesso a uma API, facilitando a comunicação entre clientes e servidores de API de forma segura e eficiente.</a:t>
-            </a:r>
-          </a:p>
-          <a:p>
-            <a:pPr marL="0" indent="0" defTabSz="252475">
-              <a:lnSpc>
-                <a:spcPct val="100000"/>
-              </a:lnSpc>
-              <a:spcBef>
-                <a:spcPts val="0"/>
-              </a:spcBef>
-              <a:buSzTx/>
-              <a:buNone/>
-              <a:defRPr sz="2982"/>
-            </a:pPr>
-          </a:p>
-          <a:p>
-            <a:pPr marL="0" indent="0" defTabSz="252475">
+            <a:pPr marL="0" indent="0" defTabSz="266700">
+              <a:lnSpc>
+                <a:spcPct val="100000"/>
+              </a:lnSpc>
+              <a:spcBef>
+                <a:spcPts val="0"/>
+              </a:spcBef>
+              <a:buSzTx/>
+              <a:buNone/>
+              <a:defRPr sz="3150"/>
+            </a:pPr>
+          </a:p>
+          <a:p>
+            <a:pPr marL="0" indent="0" defTabSz="266700">
+              <a:lnSpc>
+                <a:spcPct val="100000"/>
+              </a:lnSpc>
+              <a:spcBef>
+                <a:spcPts val="0"/>
+              </a:spcBef>
+              <a:buSzTx/>
+              <a:buNone/>
+              <a:defRPr sz="3150"/>
+            </a:pPr>
+            <a:r>
+              <a:t>É um dispositivo ou software que atua como intermediário entre dois sistemas ou redes diferentes, facilitando a comunicação entre eles. Ele desempenha o papel de "portão de entrada" ou "portal" que controla o acesso e direciona o tráfego de informações entre os sistemas.</a:t>
+            </a:r>
+          </a:p>
+          <a:p>
+            <a:pPr marL="0" indent="0" defTabSz="266700">
+              <a:lnSpc>
+                <a:spcPct val="100000"/>
+              </a:lnSpc>
+              <a:spcBef>
+                <a:spcPts val="0"/>
+              </a:spcBef>
+              <a:buSzTx/>
+              <a:buNone/>
+              <a:defRPr sz="3150"/>
+            </a:pPr>
+          </a:p>
+          <a:p>
+            <a:pPr marL="0" indent="0" defTabSz="266700">
+              <a:lnSpc>
+                <a:spcPct val="100000"/>
+              </a:lnSpc>
+              <a:spcBef>
+                <a:spcPts val="0"/>
+              </a:spcBef>
+              <a:buSzTx/>
+              <a:buNone/>
+              <a:defRPr sz="3150"/>
+            </a:pPr>
+            <a:r>
+              <a:t>Gateway de APIs é uma ferramenta poderosa para gerenciar, proteger e otimizar o acesso a uma ou mais APIs, facilitando a comunicação entre clientes e servidores de API de forma segura e eficiente além de facilitar a comunicação entre diferentes APIs, permitindo que aplicativos e sistemas usem serviços de terceiros de forma integrada.</a:t>
+            </a:r>
+          </a:p>
+          <a:p>
+            <a:pPr marL="0" indent="0" defTabSz="266700">
+              <a:lnSpc>
+                <a:spcPct val="100000"/>
+              </a:lnSpc>
+              <a:spcBef>
+                <a:spcPts val="0"/>
+              </a:spcBef>
+              <a:buSzTx/>
+              <a:buNone/>
+              <a:defRPr sz="3150"/>
+            </a:pPr>
+          </a:p>
+          <a:p>
+            <a:pPr marL="0" indent="0" defTabSz="266700">
               <a:lnSpc>
                 <a:spcPct val="100000"/>
               </a:lnSpc>
@@ -5895,14 +5950,14 @@
               </a:spcBef>
               <a:buSzTx/>
               <a:buNone/>
-              <a:defRPr b="1" sz="2982"/>
-            </a:pPr>
-            <a:r>
-              <a:t>Exemplos de Gateways:</a:t>
-            </a:r>
-          </a:p>
-          <a:p>
-            <a:pPr marL="364687" indent="-364687" defTabSz="252475">
+              <a:defRPr b="1" sz="3150"/>
+            </a:pPr>
+            <a:r>
+              <a:t>Exemplo de uma GTW de pagamentos:</a:t>
+            </a:r>
+          </a:p>
+          <a:p>
+            <a:pPr lvl="1" marL="385233" indent="-385233" defTabSz="266700">
               <a:lnSpc>
                 <a:spcPct val="100000"/>
               </a:lnSpc>
@@ -5910,33 +5965,14 @@
                 <a:spcPts val="0"/>
               </a:spcBef>
               <a:buFont typeface="Menlo Regular"/>
-              <a:defRPr sz="2982"/>
+              <a:defRPr sz="3150"/>
             </a:pPr>
             <a:r>
               <a:rPr b="1"/>
-              <a:t>Gateway de API geral</a:t>
-            </a:r>
-            <a:r>
-              <a:t>: Facilita a comunicação entre diferentes APIs, permitindo que aplicativos e sistemas usem serviços de terceiros de forma integrada.</a:t>
-            </a:r>
-          </a:p>
-          <a:p>
-            <a:pPr lvl="1" marL="364687" indent="-364687" defTabSz="252475">
-              <a:lnSpc>
-                <a:spcPct val="100000"/>
-              </a:lnSpc>
-              <a:spcBef>
-                <a:spcPts val="0"/>
-              </a:spcBef>
-              <a:buFont typeface="Menlo Regular"/>
-              <a:defRPr sz="2982"/>
-            </a:pPr>
-            <a:r>
-              <a:rPr b="1"/>
-              <a:t>Gateway de API  Pagamento</a:t>
-            </a:r>
-            <a:r>
-              <a:t>: Facilita a comunicação entre um site de comércio eletrônico e o sistema de processamento de pagamentos, garantindo transações seguras e eficientes. Imagine que seu site tem um sistema de pagamentos que utiliza, PIX, cartão de crédito e débito e Pay Pal, você tem que desenvolver uma integração com cada um desses sistemas,  mas para facilitar e centralizar principalmente a segurança você pode utilizar o gateway para agrupar todos os serviços de pagamentos reunindo  eles em um único lugar. Além disso, vamos supor que esses diferentes sistemas de pagamento não utilizem a mesma língua, o Gateway pode realizar essa tradução e o site que consome através do Gateway não precisando falar várias línguas diferentes para cada uma das integrações de pagamento, pois elas estão agrupadas no Gateway que realiza essa tradução para uma única língua que o site possa falar.</a:t>
+              <a:t>Gateway API Pagamento</a:t>
+            </a:r>
+            <a:r>
+              <a:t>: Facilita a comunicação entre um site de comércio eletrônico e o sistema de processamento de pagamentos, garantindo transações seguras e eficientes. Imagine que seu site tem um sistema de pagamentos que utiliza, PIX, cartão de crédito e débito e Pay Pal, você tem que desenvolver uma integração com cada um desses sistemas,  mas para facilitar e centralizar principalmente a segurança você pode utilizar um gateway para agrupar todos os serviços de pagamentos reunindo eles em um único lugar. Além disso, vamos supor que esses diferentes sistemas de pagamento não utilizem a mesma língua, o Gateway pode realizar essa tradução fazendo com que o sistema em questão não precise falar várias línguas diferentes para cada uma das integrações de pagamento, pois elas estão agrupadas no Gateway que realiza essa tradução para uma única língua que o sistema/site seja capaz de entender.</a:t>
             </a:r>
           </a:p>
         </p:txBody>
@@ -5980,7 +6016,7 @@
       </p:grpSpPr>
       <p:sp>
         <p:nvSpPr>
-          <p:cNvPr id="191" name="O que é GIT?"/>
+          <p:cNvPr id="191" name="GIT"/>
           <p:cNvSpPr txBox="1"/>
           <p:nvPr>
             <p:ph type="title"/>
@@ -5993,11 +6029,15 @@
         </p:spPr>
         <p:txBody>
           <a:bodyPr/>
-          <a:lstStyle/>
+          <a:lstStyle>
+            <a:lvl1pPr>
+              <a:defRPr spc="-140" sz="7000"/>
+            </a:lvl1pPr>
+          </a:lstStyle>
           <a:p>
             <a:pPr/>
             <a:r>
-              <a:t>O que é GIT?</a:t>
+              <a:t>GIT</a:t>
             </a:r>
           </a:p>
         </p:txBody>
@@ -6364,7 +6404,7 @@
       </p:grpSpPr>
       <p:sp>
         <p:nvSpPr>
-          <p:cNvPr id="194" name="O que é Github?"/>
+          <p:cNvPr id="194" name="GitHub"/>
           <p:cNvSpPr txBox="1"/>
           <p:nvPr>
             <p:ph type="title"/>
@@ -6377,11 +6417,15 @@
         </p:spPr>
         <p:txBody>
           <a:bodyPr/>
-          <a:lstStyle/>
+          <a:lstStyle>
+            <a:lvl1pPr>
+              <a:defRPr spc="-140" sz="7000"/>
+            </a:lvl1pPr>
+          </a:lstStyle>
           <a:p>
             <a:pPr/>
             <a:r>
-              <a:t>O que é Github?</a:t>
+              <a:t>GitHub</a:t>
             </a:r>
           </a:p>
         </p:txBody>
@@ -6407,7 +6451,7 @@
           <a:bodyPr/>
           <a:lstStyle/>
           <a:p>
-            <a:pPr marL="0" indent="0" defTabSz="374904">
+            <a:pPr marL="0" indent="0" defTabSz="356615">
               <a:lnSpc>
                 <a:spcPct val="100000"/>
               </a:lnSpc>
@@ -6416,40 +6460,30 @@
               </a:spcBef>
               <a:buSzTx/>
               <a:buNone/>
-              <a:defRPr sz="3443">
-                <a:latin typeface="Times Roman"/>
-                <a:ea typeface="Times Roman"/>
-                <a:cs typeface="Times Roman"/>
-                <a:sym typeface="Times Roman"/>
-              </a:defRPr>
+              <a:defRPr sz="3275"/>
             </a:pPr>
             <a:r>
               <a:t>GitHub é uma plataforma de hospedagem de código-fonte e colaboração para desenvolvimento de software. Ele permite que desenvolvedores armazenem, gerenciem e compartilhem projetos de software usando o sistema de controle de versão Git. Além disso, o GitHub oferece recursos adicionais, como controle de acesso, rastreamento de problemas, integração contínua e hospedagem de páginas da web, que tornam o desenvolvimento de software colaborativo mais eficiente e organizado.</a:t>
             </a:r>
           </a:p>
           <a:p>
-            <a:pPr marL="0" indent="0" defTabSz="374904">
-              <a:lnSpc>
-                <a:spcPct val="100000"/>
-              </a:lnSpc>
-              <a:spcBef>
-                <a:spcPts val="1100"/>
-              </a:spcBef>
-              <a:buSzTx/>
-              <a:buNone/>
-              <a:defRPr b="1" sz="3443">
-                <a:latin typeface="Times Roman"/>
-                <a:ea typeface="Times Roman"/>
-                <a:cs typeface="Times Roman"/>
-                <a:sym typeface="Times Roman"/>
-              </a:defRPr>
+            <a:pPr marL="0" indent="0" defTabSz="356615">
+              <a:lnSpc>
+                <a:spcPct val="100000"/>
+              </a:lnSpc>
+              <a:spcBef>
+                <a:spcPts val="1000"/>
+              </a:spcBef>
+              <a:buSzTx/>
+              <a:buNone/>
+              <a:defRPr b="1" sz="3275"/>
             </a:pPr>
             <a:r>
               <a:t>Principais Recursos do GitHub:</a:t>
             </a:r>
           </a:p>
           <a:p>
-            <a:pPr marL="374904" indent="-260350" defTabSz="374904">
+            <a:pPr marL="356615" indent="-247650" defTabSz="356615">
               <a:lnSpc>
                 <a:spcPct val="100000"/>
               </a:lnSpc>
@@ -6459,12 +6493,7 @@
               <a:buSzPct val="100000"/>
               <a:buFont typeface="Times Roman"/>
               <a:buAutoNum type="arabicPeriod" startAt="1"/>
-              <a:defRPr sz="3443">
-                <a:latin typeface="Times Roman"/>
-                <a:ea typeface="Times Roman"/>
-                <a:cs typeface="Times Roman"/>
-                <a:sym typeface="Times Roman"/>
-              </a:defRPr>
+              <a:defRPr sz="3275"/>
             </a:pPr>
             <a:r>
               <a:rPr b="1"/>
@@ -6475,7 +6504,7 @@
             </a:r>
           </a:p>
           <a:p>
-            <a:pPr marL="374904" indent="-260350" defTabSz="374904">
+            <a:pPr marL="356615" indent="-247650" defTabSz="356615">
               <a:lnSpc>
                 <a:spcPct val="100000"/>
               </a:lnSpc>
@@ -6485,12 +6514,7 @@
               <a:buSzPct val="100000"/>
               <a:buFont typeface="Times Roman"/>
               <a:buAutoNum type="arabicPeriod" startAt="1"/>
-              <a:defRPr sz="3443">
-                <a:latin typeface="Times Roman"/>
-                <a:ea typeface="Times Roman"/>
-                <a:cs typeface="Times Roman"/>
-                <a:sym typeface="Times Roman"/>
-              </a:defRPr>
+              <a:defRPr sz="3275"/>
             </a:pPr>
             <a:r>
               <a:rPr b="1"/>
@@ -6501,7 +6525,7 @@
             </a:r>
           </a:p>
           <a:p>
-            <a:pPr marL="374904" indent="-260350" defTabSz="374904">
+            <a:pPr marL="356615" indent="-247650" defTabSz="356615">
               <a:lnSpc>
                 <a:spcPct val="100000"/>
               </a:lnSpc>
@@ -6511,12 +6535,7 @@
               <a:buSzPct val="100000"/>
               <a:buFont typeface="Times Roman"/>
               <a:buAutoNum type="arabicPeriod" startAt="1"/>
-              <a:defRPr sz="3443">
-                <a:latin typeface="Times Roman"/>
-                <a:ea typeface="Times Roman"/>
-                <a:cs typeface="Times Roman"/>
-                <a:sym typeface="Times Roman"/>
-              </a:defRPr>
+              <a:defRPr sz="3275"/>
             </a:pPr>
             <a:r>
               <a:rPr b="1"/>
@@ -6527,7 +6546,7 @@
             </a:r>
           </a:p>
           <a:p>
-            <a:pPr marL="374904" indent="-260350" defTabSz="374904">
+            <a:pPr marL="356615" indent="-247650" defTabSz="356615">
               <a:lnSpc>
                 <a:spcPct val="100000"/>
               </a:lnSpc>
@@ -6537,12 +6556,7 @@
               <a:buSzPct val="100000"/>
               <a:buFont typeface="Times Roman"/>
               <a:buAutoNum type="arabicPeriod" startAt="1"/>
-              <a:defRPr sz="3443">
-                <a:latin typeface="Times Roman"/>
-                <a:ea typeface="Times Roman"/>
-                <a:cs typeface="Times Roman"/>
-                <a:sym typeface="Times Roman"/>
-              </a:defRPr>
+              <a:defRPr sz="3275"/>
             </a:pPr>
             <a:r>
               <a:rPr b="1"/>
@@ -6553,7 +6567,7 @@
             </a:r>
           </a:p>
           <a:p>
-            <a:pPr marL="374904" indent="-260350" defTabSz="374904">
+            <a:pPr marL="356615" indent="-247650" defTabSz="356615">
               <a:lnSpc>
                 <a:spcPct val="100000"/>
               </a:lnSpc>
@@ -6563,12 +6577,7 @@
               <a:buSzPct val="100000"/>
               <a:buFont typeface="Times Roman"/>
               <a:buAutoNum type="arabicPeriod" startAt="1"/>
-              <a:defRPr sz="3443">
-                <a:latin typeface="Times Roman"/>
-                <a:ea typeface="Times Roman"/>
-                <a:cs typeface="Times Roman"/>
-                <a:sym typeface="Times Roman"/>
-              </a:defRPr>
+              <a:defRPr sz="3275"/>
             </a:pPr>
             <a:r>
               <a:rPr b="1"/>

</xml_diff>